<commit_message>
Final updates before presentation
</commit_message>
<xml_diff>
--- a/Raspberry Pi Final Project.pptx
+++ b/Raspberry Pi Final Project.pptx
@@ -8,12 +8,11 @@
     <p:sldId id="256" r:id="rId2"/>
     <p:sldId id="257" r:id="rId3"/>
     <p:sldId id="262" r:id="rId4"/>
-    <p:sldId id="264" r:id="rId5"/>
-    <p:sldId id="263" r:id="rId6"/>
+    <p:sldId id="263" r:id="rId5"/>
+    <p:sldId id="264" r:id="rId6"/>
     <p:sldId id="258" r:id="rId7"/>
-    <p:sldId id="259" r:id="rId8"/>
-    <p:sldId id="261" r:id="rId9"/>
-    <p:sldId id="260" r:id="rId10"/>
+    <p:sldId id="261" r:id="rId8"/>
+    <p:sldId id="260" r:id="rId9"/>
   </p:sldIdLst>
   <p:sldSz cx="12192000" cy="6858000"/>
   <p:notesSz cx="6858000" cy="9144000"/>
@@ -257,7 +256,7 @@
           <a:p>
             <a:fld id="{6099F8AE-7ECE-4638-B851-44914CE51600}" type="datetimeFigureOut">
               <a:rPr lang="en-US" smtClean="0"/>
-              <a:t>5/12/2017</a:t>
+              <a:t>5/17/2017</a:t>
             </a:fld>
             <a:endParaRPr lang="en-US"/>
           </a:p>
@@ -544,7 +543,7 @@
           <a:p>
             <a:fld id="{6099F8AE-7ECE-4638-B851-44914CE51600}" type="datetimeFigureOut">
               <a:rPr lang="en-US" smtClean="0"/>
-              <a:t>5/12/2017</a:t>
+              <a:t>5/17/2017</a:t>
             </a:fld>
             <a:endParaRPr lang="en-US"/>
           </a:p>
@@ -736,7 +735,7 @@
           <a:p>
             <a:fld id="{6099F8AE-7ECE-4638-B851-44914CE51600}" type="datetimeFigureOut">
               <a:rPr lang="en-US" smtClean="0"/>
-              <a:t>5/12/2017</a:t>
+              <a:t>5/17/2017</a:t>
             </a:fld>
             <a:endParaRPr lang="en-US"/>
           </a:p>
@@ -997,7 +996,7 @@
           <a:p>
             <a:fld id="{6099F8AE-7ECE-4638-B851-44914CE51600}" type="datetimeFigureOut">
               <a:rPr lang="en-US" smtClean="0"/>
-              <a:t>5/12/2017</a:t>
+              <a:t>5/17/2017</a:t>
             </a:fld>
             <a:endParaRPr lang="en-US"/>
           </a:p>
@@ -1421,7 +1420,7 @@
           <a:p>
             <a:fld id="{6099F8AE-7ECE-4638-B851-44914CE51600}" type="datetimeFigureOut">
               <a:rPr lang="en-US" smtClean="0"/>
-              <a:t>5/12/2017</a:t>
+              <a:t>5/17/2017</a:t>
             </a:fld>
             <a:endParaRPr lang="en-US"/>
           </a:p>
@@ -1967,7 +1966,7 @@
           <a:p>
             <a:fld id="{6099F8AE-7ECE-4638-B851-44914CE51600}" type="datetimeFigureOut">
               <a:rPr lang="en-US" smtClean="0"/>
-              <a:t>5/12/2017</a:t>
+              <a:t>5/17/2017</a:t>
             </a:fld>
             <a:endParaRPr lang="en-US"/>
           </a:p>
@@ -2807,7 +2806,7 @@
           <a:p>
             <a:fld id="{6099F8AE-7ECE-4638-B851-44914CE51600}" type="datetimeFigureOut">
               <a:rPr lang="en-US" smtClean="0"/>
-              <a:t>5/12/2017</a:t>
+              <a:t>5/17/2017</a:t>
             </a:fld>
             <a:endParaRPr lang="en-US"/>
           </a:p>
@@ -2977,7 +2976,7 @@
           <a:p>
             <a:fld id="{6099F8AE-7ECE-4638-B851-44914CE51600}" type="datetimeFigureOut">
               <a:rPr lang="en-US" smtClean="0"/>
-              <a:t>5/12/2017</a:t>
+              <a:t>5/17/2017</a:t>
             </a:fld>
             <a:endParaRPr lang="en-US"/>
           </a:p>
@@ -3161,7 +3160,7 @@
           <a:p>
             <a:fld id="{6099F8AE-7ECE-4638-B851-44914CE51600}" type="datetimeFigureOut">
               <a:rPr lang="en-US" smtClean="0"/>
-              <a:t>5/12/2017</a:t>
+              <a:t>5/17/2017</a:t>
             </a:fld>
             <a:endParaRPr lang="en-US"/>
           </a:p>
@@ -3331,7 +3330,7 @@
           <a:p>
             <a:fld id="{6099F8AE-7ECE-4638-B851-44914CE51600}" type="datetimeFigureOut">
               <a:rPr lang="en-US" smtClean="0"/>
-              <a:t>5/12/2017</a:t>
+              <a:t>5/17/2017</a:t>
             </a:fld>
             <a:endParaRPr lang="en-US"/>
           </a:p>
@@ -3579,7 +3578,7 @@
           <a:p>
             <a:fld id="{6099F8AE-7ECE-4638-B851-44914CE51600}" type="datetimeFigureOut">
               <a:rPr lang="en-US" smtClean="0"/>
-              <a:t>5/12/2017</a:t>
+              <a:t>5/17/2017</a:t>
             </a:fld>
             <a:endParaRPr lang="en-US"/>
           </a:p>
@@ -3816,7 +3815,7 @@
           <a:p>
             <a:fld id="{6099F8AE-7ECE-4638-B851-44914CE51600}" type="datetimeFigureOut">
               <a:rPr lang="en-US" smtClean="0"/>
-              <a:t>5/12/2017</a:t>
+              <a:t>5/17/2017</a:t>
             </a:fld>
             <a:endParaRPr lang="en-US"/>
           </a:p>
@@ -4189,7 +4188,7 @@
           <a:p>
             <a:fld id="{6099F8AE-7ECE-4638-B851-44914CE51600}" type="datetimeFigureOut">
               <a:rPr lang="en-US" smtClean="0"/>
-              <a:t>5/12/2017</a:t>
+              <a:t>5/17/2017</a:t>
             </a:fld>
             <a:endParaRPr lang="en-US"/>
           </a:p>
@@ -4307,7 +4306,7 @@
           <a:p>
             <a:fld id="{6099F8AE-7ECE-4638-B851-44914CE51600}" type="datetimeFigureOut">
               <a:rPr lang="en-US" smtClean="0"/>
-              <a:t>5/12/2017</a:t>
+              <a:t>5/17/2017</a:t>
             </a:fld>
             <a:endParaRPr lang="en-US"/>
           </a:p>
@@ -4402,7 +4401,7 @@
           <a:p>
             <a:fld id="{6099F8AE-7ECE-4638-B851-44914CE51600}" type="datetimeFigureOut">
               <a:rPr lang="en-US" smtClean="0"/>
-              <a:t>5/12/2017</a:t>
+              <a:t>5/17/2017</a:t>
             </a:fld>
             <a:endParaRPr lang="en-US"/>
           </a:p>
@@ -4653,7 +4652,7 @@
           <a:p>
             <a:fld id="{6099F8AE-7ECE-4638-B851-44914CE51600}" type="datetimeFigureOut">
               <a:rPr lang="en-US" smtClean="0"/>
-              <a:t>5/12/2017</a:t>
+              <a:t>5/17/2017</a:t>
             </a:fld>
             <a:endParaRPr lang="en-US"/>
           </a:p>
@@ -4940,7 +4939,7 @@
           <a:p>
             <a:fld id="{6099F8AE-7ECE-4638-B851-44914CE51600}" type="datetimeFigureOut">
               <a:rPr lang="en-US" smtClean="0"/>
-              <a:t>5/12/2017</a:t>
+              <a:t>5/17/2017</a:t>
             </a:fld>
             <a:endParaRPr lang="en-US"/>
           </a:p>
@@ -5153,7 +5152,7 @@
           <a:p>
             <a:fld id="{6099F8AE-7ECE-4638-B851-44914CE51600}" type="datetimeFigureOut">
               <a:rPr lang="en-US" smtClean="0"/>
-              <a:t>5/12/2017</a:t>
+              <a:t>5/17/2017</a:t>
             </a:fld>
             <a:endParaRPr lang="en-US"/>
           </a:p>
@@ -5655,9 +5654,10 @@
           <a:lstStyle/>
           <a:p>
             <a:r>
-              <a:rPr lang="en-US" dirty="0"/>
-              <a:t>Hack Out</a:t>
-            </a:r>
+              <a:rPr lang="en-US" dirty="0" err="1" smtClean="0"/>
+              <a:t>Hack.Out</a:t>
+            </a:r>
+            <a:endParaRPr lang="en-US" dirty="0"/>
           </a:p>
         </p:txBody>
       </p:sp>
@@ -5758,34 +5758,36 @@
           <a:lstStyle/>
           <a:p>
             <a:r>
+              <a:rPr lang="en-US" dirty="0" smtClean="0"/>
+              <a:t>In the game, you control a 2d character going through a cyberspace of different classic game dimensions. By solving computer science related problems, you access new areas.</a:t>
+            </a:r>
+            <a:endParaRPr lang="en-US" dirty="0"/>
+          </a:p>
+          <a:p>
+            <a:r>
               <a:rPr lang="en-US" dirty="0"/>
-              <a:t>Our puzzle is  your  control  a little person that is in </a:t>
+              <a:t> </a:t>
             </a:r>
             <a:r>
               <a:rPr lang="en-US" dirty="0" smtClean="0"/>
-              <a:t>a cyberspace </a:t>
-            </a:r>
-            <a:r>
-              <a:rPr lang="en-US" dirty="0"/>
-              <a:t>and trying to  </a:t>
+              <a:t>You control the character by using the arrow keys, which is processed through </a:t>
+            </a:r>
+            <a:r>
+              <a:rPr lang="en-US" dirty="0" err="1" smtClean="0"/>
+              <a:t>pygame</a:t>
             </a:r>
             <a:r>
               <a:rPr lang="en-US" dirty="0" smtClean="0"/>
-              <a:t>escape, which involves him hacking out by solving Computer science problems.</a:t>
+              <a:t>, an essential library used when we made the game</a:t>
             </a:r>
             <a:endParaRPr lang="en-US" dirty="0"/>
           </a:p>
           <a:p>
             <a:r>
-              <a:rPr lang="en-US" dirty="0"/>
-              <a:t> It work by you pressing buttons and those buttons cause the person to move. The buttons are mark up ,down, right, and left.</a:t>
-            </a:r>
-          </a:p>
-          <a:p>
-            <a:r>
-              <a:rPr lang="en-US" dirty="0"/>
-              <a:t>It is relevant because show how we import your coding for 130-132.</a:t>
-            </a:r>
+              <a:rPr lang="en-US" dirty="0" smtClean="0"/>
+              <a:t>The code is mainly object oriented and uses dictionaries, which shows the skills we focused on throughout the 130 series.</a:t>
+            </a:r>
+            <a:endParaRPr lang="en-US" dirty="0"/>
           </a:p>
         </p:txBody>
       </p:sp>
@@ -5868,18 +5870,14 @@
             <a:endParaRPr lang="en-US" dirty="0"/>
           </a:p>
           <a:p>
-            <a:r>
-              <a:rPr lang="en-US" dirty="0"/>
-              <a:t>Our </a:t>
-            </a:r>
+            <a:pPr marL="0" indent="0">
+              <a:buNone/>
+            </a:pPr>
             <a:r>
               <a:rPr lang="en-US" dirty="0" smtClean="0"/>
-              <a:t>materials </a:t>
-            </a:r>
-            <a:r>
-              <a:rPr lang="en-US" dirty="0"/>
-              <a:t>are besides thing we were give in 130.</a:t>
-            </a:r>
+              <a:t>Since we couldn’t incorporate GPIO usability, there weren’t really any physical materials.</a:t>
+            </a:r>
+            <a:endParaRPr lang="en-US" dirty="0"/>
           </a:p>
         </p:txBody>
       </p:sp>
@@ -5932,7 +5930,13 @@
               <a:rPr lang="en-US" b="0" dirty="0">
                 <a:effectLst/>
               </a:rPr>
-              <a:t>circuit diagram and layout diagram</a:t>
+              <a:t>source </a:t>
+            </a:r>
+            <a:r>
+              <a:rPr lang="en-US" b="0" dirty="0" smtClean="0">
+                <a:effectLst/>
+              </a:rPr>
+              <a:t>code – P1</a:t>
             </a:r>
             <a:endParaRPr lang="en-US" dirty="0"/>
           </a:p>
@@ -5953,14 +5957,130 @@
           <a:bodyPr/>
           <a:lstStyle/>
           <a:p>
+            <a:r>
+              <a:rPr lang="en-US" dirty="0" smtClean="0"/>
+              <a:t>Area Handling							Sprite Handling</a:t>
+            </a:r>
             <a:endParaRPr lang="en-US" dirty="0"/>
           </a:p>
         </p:txBody>
       </p:sp>
+      <p:pic>
+        <p:nvPicPr>
+          <p:cNvPr id="7" name="Picture 6"/>
+          <p:cNvPicPr>
+            <a:picLocks noChangeAspect="1"/>
+          </p:cNvPicPr>
+          <p:nvPr/>
+        </p:nvPicPr>
+        <p:blipFill>
+          <a:blip r:embed="rId2"/>
+          <a:stretch>
+            <a:fillRect/>
+          </a:stretch>
+        </p:blipFill>
+        <p:spPr>
+          <a:xfrm>
+            <a:off x="0" y="2595282"/>
+            <a:ext cx="6212541" cy="4262718"/>
+          </a:xfrm>
+          <a:prstGeom prst="rect">
+            <a:avLst/>
+          </a:prstGeom>
+        </p:spPr>
+      </p:pic>
+      <p:sp>
+        <p:nvSpPr>
+          <p:cNvPr id="9" name="Rectangle 8"/>
+          <p:cNvSpPr/>
+          <p:nvPr/>
+        </p:nvSpPr>
+        <p:spPr>
+          <a:xfrm>
+            <a:off x="6212541" y="2595282"/>
+            <a:ext cx="121024" cy="4262718"/>
+          </a:xfrm>
+          <a:prstGeom prst="rect">
+            <a:avLst/>
+          </a:prstGeom>
+        </p:spPr>
+        <p:style>
+          <a:lnRef idx="2">
+            <a:schemeClr val="accent1">
+              <a:shade val="50000"/>
+            </a:schemeClr>
+          </a:lnRef>
+          <a:fillRef idx="1">
+            <a:schemeClr val="accent1"/>
+          </a:fillRef>
+          <a:effectRef idx="0">
+            <a:schemeClr val="accent1"/>
+          </a:effectRef>
+          <a:fontRef idx="minor">
+            <a:schemeClr val="lt1"/>
+          </a:fontRef>
+        </p:style>
+        <p:txBody>
+          <a:bodyPr rtlCol="0" anchor="ctr"/>
+          <a:lstStyle/>
+          <a:p>
+            <a:pPr algn="ctr"/>
+            <a:endParaRPr lang="en-US"/>
+          </a:p>
+        </p:txBody>
+      </p:sp>
+      <p:pic>
+        <p:nvPicPr>
+          <p:cNvPr id="10" name="Picture 9"/>
+          <p:cNvPicPr>
+            <a:picLocks noChangeAspect="1"/>
+          </p:cNvPicPr>
+          <p:nvPr/>
+        </p:nvPicPr>
+        <p:blipFill>
+          <a:blip r:embed="rId3"/>
+          <a:stretch>
+            <a:fillRect/>
+          </a:stretch>
+        </p:blipFill>
+        <p:spPr>
+          <a:xfrm>
+            <a:off x="6333566" y="4666129"/>
+            <a:ext cx="5847786" cy="2061502"/>
+          </a:xfrm>
+          <a:prstGeom prst="rect">
+            <a:avLst/>
+          </a:prstGeom>
+        </p:spPr>
+      </p:pic>
+      <p:pic>
+        <p:nvPicPr>
+          <p:cNvPr id="11" name="Picture 10"/>
+          <p:cNvPicPr>
+            <a:picLocks noChangeAspect="1"/>
+          </p:cNvPicPr>
+          <p:nvPr/>
+        </p:nvPicPr>
+        <p:blipFill>
+          <a:blip r:embed="rId4"/>
+          <a:stretch>
+            <a:fillRect/>
+          </a:stretch>
+        </p:blipFill>
+        <p:spPr>
+          <a:xfrm>
+            <a:off x="6353735" y="2595281"/>
+            <a:ext cx="5827617" cy="2070847"/>
+          </a:xfrm>
+          <a:prstGeom prst="rect">
+            <a:avLst/>
+          </a:prstGeom>
+        </p:spPr>
+      </p:pic>
     </p:spTree>
     <p:extLst>
       <p:ext uri="{BB962C8B-B14F-4D97-AF65-F5344CB8AC3E}">
-        <p14:creationId xmlns:p14="http://schemas.microsoft.com/office/powerpoint/2010/main" val="1470526617"/>
+        <p14:creationId xmlns:p14="http://schemas.microsoft.com/office/powerpoint/2010/main" val="1327073077"/>
       </p:ext>
     </p:extLst>
   </p:cSld>
@@ -6003,10 +6123,8 @@
           <a:lstStyle/>
           <a:p>
             <a:r>
-              <a:rPr lang="en-US" b="0" dirty="0">
-                <a:effectLst/>
-              </a:rPr>
-              <a:t>source code</a:t>
+              <a:rPr lang="en-US" dirty="0" smtClean="0"/>
+              <a:t>Source Code – p2</a:t>
             </a:r>
             <a:endParaRPr lang="en-US" dirty="0"/>
           </a:p>
@@ -6027,14 +6145,130 @@
           <a:bodyPr/>
           <a:lstStyle/>
           <a:p>
+            <a:r>
+              <a:rPr lang="en-US" dirty="0" smtClean="0"/>
+              <a:t>Game Loop						Collision Detection</a:t>
+            </a:r>
+            <a:endParaRPr lang="en-US" dirty="0"/>
+          </a:p>
+        </p:txBody>
+      </p:sp>
+      <p:sp>
+        <p:nvSpPr>
+          <p:cNvPr id="4" name="Rectangle 3"/>
+          <p:cNvSpPr/>
+          <p:nvPr/>
+        </p:nvSpPr>
+        <p:spPr>
+          <a:xfrm>
+            <a:off x="5997388" y="2151529"/>
+            <a:ext cx="174812" cy="4706471"/>
+          </a:xfrm>
+          <a:prstGeom prst="rect">
+            <a:avLst/>
+          </a:prstGeom>
+        </p:spPr>
+        <p:style>
+          <a:lnRef idx="2">
+            <a:schemeClr val="accent1">
+              <a:shade val="50000"/>
+            </a:schemeClr>
+          </a:lnRef>
+          <a:fillRef idx="1">
+            <a:schemeClr val="accent1"/>
+          </a:fillRef>
+          <a:effectRef idx="0">
+            <a:schemeClr val="accent1"/>
+          </a:effectRef>
+          <a:fontRef idx="minor">
+            <a:schemeClr val="lt1"/>
+          </a:fontRef>
+        </p:style>
+        <p:txBody>
+          <a:bodyPr rtlCol="0" anchor="ctr"/>
+          <a:lstStyle/>
+          <a:p>
+            <a:pPr algn="ctr"/>
             <a:endParaRPr lang="en-US"/>
           </a:p>
         </p:txBody>
       </p:sp>
+      <p:pic>
+        <p:nvPicPr>
+          <p:cNvPr id="5" name="Picture 4"/>
+          <p:cNvPicPr>
+            <a:picLocks noChangeAspect="1"/>
+          </p:cNvPicPr>
+          <p:nvPr/>
+        </p:nvPicPr>
+        <p:blipFill>
+          <a:blip r:embed="rId2"/>
+          <a:stretch>
+            <a:fillRect/>
+          </a:stretch>
+        </p:blipFill>
+        <p:spPr>
+          <a:xfrm>
+            <a:off x="1" y="2771775"/>
+            <a:ext cx="5997388" cy="4086225"/>
+          </a:xfrm>
+          <a:prstGeom prst="rect">
+            <a:avLst/>
+          </a:prstGeom>
+        </p:spPr>
+      </p:pic>
+      <p:pic>
+        <p:nvPicPr>
+          <p:cNvPr id="6" name="Picture 5"/>
+          <p:cNvPicPr>
+            <a:picLocks noChangeAspect="1"/>
+          </p:cNvPicPr>
+          <p:nvPr/>
+        </p:nvPicPr>
+        <p:blipFill>
+          <a:blip r:embed="rId3"/>
+          <a:stretch>
+            <a:fillRect/>
+          </a:stretch>
+        </p:blipFill>
+        <p:spPr>
+          <a:xfrm>
+            <a:off x="6182849" y="4908176"/>
+            <a:ext cx="6009151" cy="1939738"/>
+          </a:xfrm>
+          <a:prstGeom prst="rect">
+            <a:avLst/>
+          </a:prstGeom>
+        </p:spPr>
+      </p:pic>
+      <p:pic>
+        <p:nvPicPr>
+          <p:cNvPr id="7" name="Picture 6"/>
+          <p:cNvPicPr>
+            <a:picLocks noChangeAspect="1"/>
+          </p:cNvPicPr>
+          <p:nvPr/>
+        </p:nvPicPr>
+        <p:blipFill>
+          <a:blip r:embed="rId4"/>
+          <a:stretch>
+            <a:fillRect/>
+          </a:stretch>
+        </p:blipFill>
+        <p:spPr>
+          <a:xfrm>
+            <a:off x="6182849" y="2771775"/>
+            <a:ext cx="6019800" cy="2145368"/>
+          </a:xfrm>
+          <a:prstGeom prst="rect">
+            <a:avLst/>
+          </a:prstGeom>
+        </p:spPr>
+      </p:pic>
     </p:spTree>
     <p:extLst>
       <p:ext uri="{BB962C8B-B14F-4D97-AF65-F5344CB8AC3E}">
-        <p14:creationId xmlns:p14="http://schemas.microsoft.com/office/powerpoint/2010/main" val="1327073077"/>
+        <p14:creationId xmlns:p14="http://schemas.microsoft.com/office/powerpoint/2010/main" val="2018884763"/>
       </p:ext>
     </p:extLst>
   </p:cSld>
@@ -6098,10 +6332,122 @@
           <a:bodyPr/>
           <a:lstStyle/>
           <a:p>
-            <a:endParaRPr lang="en-US"/>
-          </a:p>
-        </p:txBody>
-      </p:sp>
+            <a:r>
+              <a:rPr lang="en-US" dirty="0" smtClean="0"/>
+              <a:t>The main goal of the game is to find the terminal, which gives you the puzzle to solve for the area. Then, you must find the “Key” character of the area, and submit your answer, thus giving you access to the next Area portal.</a:t>
+            </a:r>
+            <a:endParaRPr lang="en-US" dirty="0"/>
+          </a:p>
+        </p:txBody>
+      </p:sp>
+      <p:pic>
+        <p:nvPicPr>
+          <p:cNvPr id="4" name="Picture 3"/>
+          <p:cNvPicPr>
+            <a:picLocks noChangeAspect="1"/>
+          </p:cNvPicPr>
+          <p:nvPr/>
+        </p:nvPicPr>
+        <p:blipFill>
+          <a:blip r:embed="rId2"/>
+          <a:stretch>
+            <a:fillRect/>
+          </a:stretch>
+        </p:blipFill>
+        <p:spPr>
+          <a:xfrm>
+            <a:off x="466725" y="3943632"/>
+            <a:ext cx="3028950" cy="2295525"/>
+          </a:xfrm>
+          <a:prstGeom prst="rect">
+            <a:avLst/>
+          </a:prstGeom>
+        </p:spPr>
+      </p:pic>
+      <p:cxnSp>
+        <p:nvCxnSpPr>
+          <p:cNvPr id="6" name="Straight Arrow Connector 5"/>
+          <p:cNvCxnSpPr/>
+          <p:nvPr/>
+        </p:nvCxnSpPr>
+        <p:spPr>
+          <a:xfrm flipV="1">
+            <a:off x="1627094" y="5298141"/>
+            <a:ext cx="161365" cy="161365"/>
+          </a:xfrm>
+          <a:prstGeom prst="straightConnector1">
+            <a:avLst/>
+          </a:prstGeom>
+          <a:ln>
+            <a:solidFill>
+              <a:srgbClr val="FF0000"/>
+            </a:solidFill>
+            <a:tailEnd type="triangle"/>
+          </a:ln>
+        </p:spPr>
+        <p:style>
+          <a:lnRef idx="1">
+            <a:schemeClr val="accent1"/>
+          </a:lnRef>
+          <a:fillRef idx="0">
+            <a:schemeClr val="accent1"/>
+          </a:fillRef>
+          <a:effectRef idx="0">
+            <a:schemeClr val="accent1"/>
+          </a:effectRef>
+          <a:fontRef idx="minor">
+            <a:schemeClr val="tx1"/>
+          </a:fontRef>
+        </p:style>
+      </p:cxnSp>
+      <p:pic>
+        <p:nvPicPr>
+          <p:cNvPr id="7" name="Picture 6"/>
+          <p:cNvPicPr>
+            <a:picLocks noChangeAspect="1"/>
+          </p:cNvPicPr>
+          <p:nvPr/>
+        </p:nvPicPr>
+        <p:blipFill>
+          <a:blip r:embed="rId3"/>
+          <a:stretch>
+            <a:fillRect/>
+          </a:stretch>
+        </p:blipFill>
+        <p:spPr>
+          <a:xfrm>
+            <a:off x="3704662" y="3665343"/>
+            <a:ext cx="4772025" cy="2573814"/>
+          </a:xfrm>
+          <a:prstGeom prst="rect">
+            <a:avLst/>
+          </a:prstGeom>
+        </p:spPr>
+      </p:pic>
+      <p:pic>
+        <p:nvPicPr>
+          <p:cNvPr id="8" name="Picture 7"/>
+          <p:cNvPicPr>
+            <a:picLocks noChangeAspect="1"/>
+          </p:cNvPicPr>
+          <p:nvPr/>
+        </p:nvPicPr>
+        <p:blipFill>
+          <a:blip r:embed="rId4"/>
+          <a:stretch>
+            <a:fillRect/>
+          </a:stretch>
+        </p:blipFill>
+        <p:spPr>
+          <a:xfrm>
+            <a:off x="8685674" y="4286532"/>
+            <a:ext cx="3028953" cy="1952625"/>
+          </a:xfrm>
+          <a:prstGeom prst="rect">
+            <a:avLst/>
+          </a:prstGeom>
+        </p:spPr>
+      </p:pic>
     </p:spTree>
     <p:extLst>
       <p:ext uri="{BB962C8B-B14F-4D97-AF65-F5344CB8AC3E}">
@@ -6149,7 +6495,7 @@
           <a:p>
             <a:r>
               <a:rPr lang="en-US" dirty="0"/>
-              <a:t>How it come out</a:t>
+              <a:t>Old and new  targets</a:t>
             </a:r>
           </a:p>
         </p:txBody>
@@ -6169,14 +6515,62 @@
           <a:bodyPr/>
           <a:lstStyle/>
           <a:p>
-            <a:endParaRPr lang="en-US"/>
+            <a:r>
+              <a:rPr lang="en-US" dirty="0"/>
+              <a:t>Old </a:t>
+            </a:r>
+            <a:r>
+              <a:rPr lang="en-US" dirty="0" smtClean="0"/>
+              <a:t>targets – Implement character movement and room tracking. Debug exit errors and room setup errors. Add functioning images and create unique backgrounds for each area.</a:t>
+            </a:r>
+            <a:endParaRPr lang="en-US" dirty="0"/>
+          </a:p>
+          <a:p>
+            <a:endParaRPr lang="en-US" dirty="0"/>
+          </a:p>
+          <a:p>
+            <a:r>
+              <a:rPr lang="en-US" dirty="0"/>
+              <a:t>New </a:t>
+            </a:r>
+            <a:r>
+              <a:rPr lang="en-US" dirty="0" smtClean="0"/>
+              <a:t>targets – Implement more areas, add animated character walking through a circular picture buffer. Add </a:t>
+            </a:r>
+            <a:r>
+              <a:rPr lang="en-US" dirty="0" err="1" smtClean="0"/>
+              <a:t>tkinter</a:t>
+            </a:r>
+            <a:r>
+              <a:rPr lang="en-US" dirty="0" smtClean="0"/>
+              <a:t> usability with </a:t>
+            </a:r>
+            <a:r>
+              <a:rPr lang="en-US" dirty="0" smtClean="0"/>
+              <a:t>an inventory and area completion UI. Create more unique backgrounds, random soundtrack selection, and add a full story to the game. Add </a:t>
+            </a:r>
+            <a:r>
+              <a:rPr lang="en-US" dirty="0" err="1" smtClean="0"/>
+              <a:t>cutscenes</a:t>
+            </a:r>
+            <a:r>
+              <a:rPr lang="en-US" dirty="0" smtClean="0"/>
+              <a:t> for the start and end of the game sequences.</a:t>
+            </a:r>
+            <a:endParaRPr lang="en-US" dirty="0"/>
+          </a:p>
+          <a:p>
+            <a:pPr marL="0" indent="0">
+              <a:buNone/>
+            </a:pPr>
+            <a:endParaRPr lang="en-US" dirty="0"/>
           </a:p>
         </p:txBody>
       </p:sp>
     </p:spTree>
     <p:extLst>
       <p:ext uri="{BB962C8B-B14F-4D97-AF65-F5344CB8AC3E}">
-        <p14:creationId xmlns:p14="http://schemas.microsoft.com/office/powerpoint/2010/main" val="3535688082"/>
+        <p14:creationId xmlns:p14="http://schemas.microsoft.com/office/powerpoint/2010/main" val="2345923249"/>
       </p:ext>
     </p:extLst>
   </p:cSld>
@@ -6220,7 +6614,7 @@
           <a:p>
             <a:r>
               <a:rPr lang="en-US" dirty="0"/>
-              <a:t>Old and new  targets</a:t>
+              <a:t>future development and lessons</a:t>
             </a:r>
           </a:p>
         </p:txBody>
@@ -6242,106 +6636,90 @@
           <a:p>
             <a:r>
               <a:rPr lang="en-US" dirty="0"/>
-              <a:t>Old   targets were 3 room and 3 floor. Use the  labs to track heath  in each room.  Solve  word by  in each room. Use button to move the person in each room.</a:t>
-            </a:r>
-          </a:p>
-          <a:p>
+              <a:t>Future development  to our project could </a:t>
+            </a:r>
+            <a:r>
+              <a:rPr lang="en-US" dirty="0" smtClean="0"/>
+              <a:t>add diverse player movement and object clipping. Making our game more unique will be another step we strive to complete.</a:t>
+            </a:r>
+            <a:r>
+              <a:rPr lang="en-US" dirty="0" smtClean="0"/>
+              <a:t> Another feature we will add is you can fight </a:t>
+            </a:r>
+            <a:r>
+              <a:rPr lang="en-US" dirty="0"/>
+              <a:t>enemies in the rooms. Also </a:t>
+            </a:r>
+            <a:r>
+              <a:rPr lang="en-US" dirty="0" smtClean="0"/>
+              <a:t>we</a:t>
+            </a:r>
+            <a:r>
+              <a:rPr lang="en-US" dirty="0" smtClean="0"/>
+              <a:t> </a:t>
+            </a:r>
+            <a:r>
+              <a:rPr lang="en-US" dirty="0"/>
+              <a:t>could improve our program by </a:t>
+            </a:r>
+            <a:r>
+              <a:rPr lang="en-US" dirty="0" smtClean="0"/>
+              <a:t>giving </a:t>
+            </a:r>
+            <a:r>
+              <a:rPr lang="en-US" dirty="0" smtClean="0"/>
+              <a:t>the player a map of the area and cutting dead content.</a:t>
+            </a:r>
+            <a:r>
+              <a:rPr lang="en-US" dirty="0" smtClean="0"/>
+              <a:t>  </a:t>
+            </a:r>
             <a:endParaRPr lang="en-US" dirty="0"/>
           </a:p>
           <a:p>
             <a:r>
               <a:rPr lang="en-US" dirty="0"/>
-              <a:t>New targets</a:t>
-            </a:r>
-          </a:p>
-          <a:p>
-            <a:pPr marL="0" indent="0">
-              <a:buNone/>
-            </a:pPr>
-            <a:endParaRPr lang="en-US" dirty="0"/>
-          </a:p>
-        </p:txBody>
-      </p:sp>
-    </p:spTree>
-    <p:extLst>
-      <p:ext uri="{BB962C8B-B14F-4D97-AF65-F5344CB8AC3E}">
-        <p14:creationId xmlns:p14="http://schemas.microsoft.com/office/powerpoint/2010/main" val="2345923249"/>
-      </p:ext>
-    </p:extLst>
-  </p:cSld>
-  <p:clrMapOvr>
-    <a:masterClrMapping/>
-  </p:clrMapOvr>
-</p:sld>
-</file>
-
-<file path=ppt/slides/slide9.xml><?xml version="1.0" encoding="utf-8"?>
-<p:sld xmlns:a="http://schemas.openxmlformats.org/drawingml/2006/main" xmlns:r="http://schemas.openxmlformats.org/officeDocument/2006/relationships" xmlns:p="http://schemas.openxmlformats.org/presentationml/2006/main">
-  <p:cSld>
-    <p:spTree>
-      <p:nvGrpSpPr>
-        <p:cNvPr id="1" name=""/>
-        <p:cNvGrpSpPr/>
-        <p:nvPr/>
-      </p:nvGrpSpPr>
-      <p:grpSpPr>
-        <a:xfrm>
-          <a:off x="0" y="0"/>
-          <a:ext cx="0" cy="0"/>
-          <a:chOff x="0" y="0"/>
-          <a:chExt cx="0" cy="0"/>
-        </a:xfrm>
-      </p:grpSpPr>
-      <p:sp>
-        <p:nvSpPr>
-          <p:cNvPr id="2" name="Title 1"/>
-          <p:cNvSpPr>
-            <a:spLocks noGrp="1"/>
-          </p:cNvSpPr>
-          <p:nvPr>
-            <p:ph type="title"/>
-          </p:nvPr>
-        </p:nvSpPr>
-        <p:spPr/>
-        <p:txBody>
-          <a:bodyPr/>
-          <a:lstStyle/>
-          <a:p>
+              <a:t>We  learned how to work as a team. We </a:t>
+            </a:r>
+            <a:r>
+              <a:rPr lang="en-US" dirty="0" smtClean="0"/>
+              <a:t>also learned </a:t>
+            </a:r>
             <a:r>
               <a:rPr lang="en-US" dirty="0"/>
-              <a:t>future development and lessons</a:t>
-            </a:r>
-          </a:p>
-        </p:txBody>
-      </p:sp>
-      <p:sp>
-        <p:nvSpPr>
-          <p:cNvPr id="3" name="Content Placeholder 2"/>
-          <p:cNvSpPr>
-            <a:spLocks noGrp="1"/>
-          </p:cNvSpPr>
-          <p:nvPr>
-            <p:ph idx="1"/>
-          </p:nvPr>
-        </p:nvSpPr>
-        <p:spPr/>
-        <p:txBody>
-          <a:bodyPr/>
-          <a:lstStyle/>
-          <a:p>
+              <a:t>how to code </a:t>
+            </a:r>
+            <a:r>
+              <a:rPr lang="en-US" dirty="0" smtClean="0"/>
+              <a:t>games</a:t>
+            </a:r>
             <a:r>
               <a:rPr lang="en-US" dirty="0"/>
-              <a:t>Future development  to our project could make the person jump and talk to new charters.  Another import is  you could fight enemies in the rooms. Also it could improve our program by give it a map of the building.  </a:t>
-            </a:r>
-          </a:p>
-          <a:p>
+              <a:t>, </a:t>
+            </a:r>
+            <a:r>
+              <a:rPr lang="en-US" dirty="0" smtClean="0"/>
+              <a:t>debug exceptions,</a:t>
+            </a:r>
+            <a:r>
+              <a:rPr lang="en-US" dirty="0" smtClean="0"/>
+              <a:t> use </a:t>
+            </a:r>
+            <a:r>
+              <a:rPr lang="en-US" dirty="0" err="1" smtClean="0"/>
+              <a:t>pygame</a:t>
+            </a:r>
+            <a:r>
+              <a:rPr lang="en-US" dirty="0" smtClean="0"/>
+              <a:t>, </a:t>
+            </a:r>
             <a:r>
               <a:rPr lang="en-US" dirty="0"/>
-              <a:t>We  learned how to work as a team. We learn how to code  games, move object change background, and keep tack </a:t>
-            </a:r>
-            <a:r>
-              <a:rPr lang="en-US"/>
-              <a:t>of life.</a:t>
+              <a:t>and </a:t>
+            </a:r>
+            <a:r>
+              <a:rPr lang="en-US" dirty="0" smtClean="0"/>
+              <a:t>design a game from the ground up.</a:t>
             </a:r>
             <a:endParaRPr lang="en-US" dirty="0"/>
           </a:p>

</xml_diff>

<commit_message>
Just an art slide.
</commit_message>
<xml_diff>
--- a/Raspberry Pi Final Project.pptx
+++ b/Raspberry Pi Final Project.pptx
@@ -10,9 +10,10 @@
     <p:sldId id="262" r:id="rId4"/>
     <p:sldId id="263" r:id="rId5"/>
     <p:sldId id="264" r:id="rId6"/>
-    <p:sldId id="258" r:id="rId7"/>
-    <p:sldId id="261" r:id="rId8"/>
-    <p:sldId id="260" r:id="rId9"/>
+    <p:sldId id="265" r:id="rId7"/>
+    <p:sldId id="258" r:id="rId8"/>
+    <p:sldId id="261" r:id="rId9"/>
+    <p:sldId id="260" r:id="rId10"/>
   </p:sldIdLst>
   <p:sldSz cx="12192000" cy="6858000"/>
   <p:notesSz cx="6858000" cy="9144000"/>
@@ -6350,6 +6351,117 @@
           <a:lstStyle/>
           <a:p>
             <a:r>
+              <a:rPr lang="en-US" dirty="0" smtClean="0"/>
+              <a:t>The Art Creation</a:t>
+            </a:r>
+            <a:endParaRPr lang="en-US" dirty="0"/>
+          </a:p>
+        </p:txBody>
+      </p:sp>
+      <p:sp>
+        <p:nvSpPr>
+          <p:cNvPr id="3" name="Content Placeholder 2"/>
+          <p:cNvSpPr>
+            <a:spLocks noGrp="1"/>
+          </p:cNvSpPr>
+          <p:nvPr>
+            <p:ph idx="1"/>
+          </p:nvPr>
+        </p:nvSpPr>
+        <p:spPr/>
+        <p:txBody>
+          <a:bodyPr/>
+          <a:lstStyle/>
+          <a:p>
+            <a:r>
+              <a:rPr lang="en-US" dirty="0" smtClean="0"/>
+              <a:t>The creation of the art was done by Gerard Nelson. He chose specific backgrounds to invoke nostalgia within the player. Sprite work is tricky, so we chose the most </a:t>
+            </a:r>
+            <a:r>
+              <a:rPr lang="en-US" dirty="0" err="1" smtClean="0"/>
+              <a:t>knowledgable</a:t>
+            </a:r>
+            <a:r>
+              <a:rPr lang="en-US" dirty="0" smtClean="0"/>
+              <a:t> person on art in our group to do this.</a:t>
+            </a:r>
+          </a:p>
+          <a:p>
+            <a:endParaRPr lang="en-US" dirty="0"/>
+          </a:p>
+          <a:p>
+            <a:r>
+              <a:rPr lang="en-US" dirty="0" smtClean="0"/>
+              <a:t>The creation of the soundtrack was done by Jacob </a:t>
+            </a:r>
+            <a:r>
+              <a:rPr lang="en-US" dirty="0" err="1" smtClean="0"/>
+              <a:t>Ryans</a:t>
+            </a:r>
+            <a:r>
+              <a:rPr lang="en-US" dirty="0" smtClean="0"/>
+              <a:t>. The soundtracks for each area come from the area theme, and were chosen carefully to give each area a complete </a:t>
+            </a:r>
+            <a:r>
+              <a:rPr lang="en-US" smtClean="0"/>
+              <a:t>robust identity.</a:t>
+            </a:r>
+            <a:endParaRPr lang="en-US" dirty="0" smtClean="0"/>
+          </a:p>
+          <a:p>
+            <a:endParaRPr lang="en-US" dirty="0"/>
+          </a:p>
+          <a:p>
+            <a:endParaRPr lang="en-US" dirty="0"/>
+          </a:p>
+        </p:txBody>
+      </p:sp>
+    </p:spTree>
+    <p:extLst>
+      <p:ext uri="{BB962C8B-B14F-4D97-AF65-F5344CB8AC3E}">
+        <p14:creationId xmlns:p14="http://schemas.microsoft.com/office/powerpoint/2010/main" val="943115892"/>
+      </p:ext>
+    </p:extLst>
+  </p:cSld>
+  <p:clrMapOvr>
+    <a:masterClrMapping/>
+  </p:clrMapOvr>
+</p:sld>
+</file>
+
+<file path=ppt/slides/slide7.xml><?xml version="1.0" encoding="utf-8"?>
+<p:sld xmlns:a="http://schemas.openxmlformats.org/drawingml/2006/main" xmlns:r="http://schemas.openxmlformats.org/officeDocument/2006/relationships" xmlns:p="http://schemas.openxmlformats.org/presentationml/2006/main">
+  <p:cSld>
+    <p:spTree>
+      <p:nvGrpSpPr>
+        <p:cNvPr id="1" name=""/>
+        <p:cNvGrpSpPr/>
+        <p:nvPr/>
+      </p:nvGrpSpPr>
+      <p:grpSpPr>
+        <a:xfrm>
+          <a:off x="0" y="0"/>
+          <a:ext cx="0" cy="0"/>
+          <a:chOff x="0" y="0"/>
+          <a:chExt cx="0" cy="0"/>
+        </a:xfrm>
+      </p:grpSpPr>
+      <p:sp>
+        <p:nvSpPr>
+          <p:cNvPr id="2" name="Title 1"/>
+          <p:cNvSpPr>
+            <a:spLocks noGrp="1"/>
+          </p:cNvSpPr>
+          <p:nvPr>
+            <p:ph type="title"/>
+          </p:nvPr>
+        </p:nvSpPr>
+        <p:spPr/>
+        <p:txBody>
+          <a:bodyPr/>
+          <a:lstStyle/>
+          <a:p>
+            <a:r>
               <a:rPr lang="en-US" dirty="0"/>
               <a:t>demonstration </a:t>
             </a:r>
@@ -6507,7 +6619,7 @@
 </p:sld>
 </file>
 
-<file path=ppt/slides/slide7.xml><?xml version="1.0" encoding="utf-8"?>
+<file path=ppt/slides/slide8.xml><?xml version="1.0" encoding="utf-8"?>
 <p:sld xmlns:a="http://schemas.openxmlformats.org/drawingml/2006/main" xmlns:r="http://schemas.openxmlformats.org/officeDocument/2006/relationships" xmlns:p="http://schemas.openxmlformats.org/presentationml/2006/main">
   <p:cSld>
     <p:spTree>
@@ -6589,11 +6701,7 @@
             </a:r>
             <a:r>
               <a:rPr lang="en-US" dirty="0" smtClean="0"/>
-              <a:t> usability with </a:t>
-            </a:r>
-            <a:r>
-              <a:rPr lang="en-US" dirty="0" smtClean="0"/>
-              <a:t>an inventory and area completion UI. Create more unique backgrounds, random soundtrack selection, and add a full story to the game. Add </a:t>
+              <a:t> usability with an inventory and area completion UI. Create more unique backgrounds, random soundtrack selection, and add a full story to the game. Add </a:t>
             </a:r>
             <a:r>
               <a:rPr lang="en-US" dirty="0" err="1" smtClean="0"/>
@@ -6633,7 +6741,7 @@
 </p:sld>
 </file>
 
-<file path=ppt/slides/slide8.xml><?xml version="1.0" encoding="utf-8"?>
+<file path=ppt/slides/slide9.xml><?xml version="1.0" encoding="utf-8"?>
 <p:sld xmlns:a="http://schemas.openxmlformats.org/drawingml/2006/main" xmlns:r="http://schemas.openxmlformats.org/officeDocument/2006/relationships" xmlns:p="http://schemas.openxmlformats.org/presentationml/2006/main">
   <p:cSld>
     <p:spTree>
@@ -6693,11 +6801,7 @@
             </a:r>
             <a:r>
               <a:rPr lang="en-US" dirty="0" smtClean="0"/>
-              <a:t>add diverse player movement and object clipping. Making our game more unique will be another step we strive to complete.</a:t>
-            </a:r>
-            <a:r>
-              <a:rPr lang="en-US" dirty="0" smtClean="0"/>
-              <a:t> Another feature we will add is you can fight </a:t>
+              <a:t>add diverse player movement and object clipping. Making our game more unique will be another step we strive to complete. Another feature we will add is you can fight </a:t>
             </a:r>
             <a:r>
               <a:rPr lang="en-US" dirty="0"/>
@@ -6705,11 +6809,7 @@
             </a:r>
             <a:r>
               <a:rPr lang="en-US" dirty="0" smtClean="0"/>
-              <a:t>we</a:t>
-            </a:r>
-            <a:r>
-              <a:rPr lang="en-US" dirty="0" smtClean="0"/>
-              <a:t> </a:t>
+              <a:t>we </a:t>
             </a:r>
             <a:r>
               <a:rPr lang="en-US" dirty="0"/>
@@ -6717,15 +6817,7 @@
             </a:r>
             <a:r>
               <a:rPr lang="en-US" dirty="0" smtClean="0"/>
-              <a:t>giving </a:t>
-            </a:r>
-            <a:r>
-              <a:rPr lang="en-US" dirty="0" smtClean="0"/>
-              <a:t>the player a map of the area and cutting dead content.</a:t>
-            </a:r>
-            <a:r>
-              <a:rPr lang="en-US" dirty="0" smtClean="0"/>
-              <a:t>  </a:t>
+              <a:t>giving the player a map of the area and cutting dead content.  </a:t>
             </a:r>
             <a:endParaRPr lang="en-US" dirty="0"/>
           </a:p>
@@ -6752,11 +6844,7 @@
             </a:r>
             <a:r>
               <a:rPr lang="en-US" dirty="0" smtClean="0"/>
-              <a:t>debug exceptions,</a:t>
-            </a:r>
-            <a:r>
-              <a:rPr lang="en-US" dirty="0" smtClean="0"/>
-              <a:t> use </a:t>
+              <a:t>debug exceptions, use </a:t>
             </a:r>
             <a:r>
               <a:rPr lang="en-US" dirty="0" err="1" smtClean="0"/>

</xml_diff>